<commit_message>
Updating code and materials
</commit_message>
<xml_diff>
--- a/project_2/heart_disease_presentation.pptx
+++ b/project_2/heart_disease_presentation.pptx
@@ -17,8 +17,8 @@
     <p:sldId id="263" r:id="rId8"/>
     <p:sldId id="264" r:id="rId9"/>
     <p:sldId id="265" r:id="rId10"/>
-    <p:sldId id="262" r:id="rId11"/>
-    <p:sldId id="266" r:id="rId12"/>
+    <p:sldId id="266" r:id="rId11"/>
+    <p:sldId id="262" r:id="rId12"/>
   </p:sldIdLst>
   <p:sldSz cx="9144000" cy="6858000" type="screen4x3"/>
   <p:notesSz cx="6858000" cy="9144000"/>
@@ -799,7 +799,7 @@
       </p:sp>
       <p:sp>
         <p:nvSpPr>
-          <p:cNvPr id="17" name="Footer Placeholder 16"/>
+          <p:cNvPr id="8" name="Footer Placeholder 7"/>
           <p:cNvSpPr>
             <a:spLocks noGrp="1"/>
           </p:cNvSpPr>
@@ -2259,7 +2259,7 @@
       </p:sp>
       <p:sp>
         <p:nvSpPr>
-          <p:cNvPr id="16" name="Footer Placeholder 15"/>
+          <p:cNvPr id="7" name="Footer Placeholder 6"/>
           <p:cNvSpPr>
             <a:spLocks noGrp="1"/>
           </p:cNvSpPr>
@@ -2865,138 +2865,6 @@
           <a:p>
             <a:r>
               <a:rPr lang="en-US" dirty="0" smtClean="0"/>
-              <a:t>We tried multiple modeling approaches to classify patients as having heart disease or not</a:t>
-            </a:r>
-            <a:endParaRPr lang="en-US" dirty="0"/>
-          </a:p>
-        </p:txBody>
-      </p:sp>
-      <p:pic>
-        <p:nvPicPr>
-          <p:cNvPr id="7170" name="Picture 2" descr="C:\Users\SKH469\capitalone-pilottwo\project_2\Model_Compare.png"/>
-          <p:cNvPicPr>
-            <a:picLocks noChangeAspect="1" noChangeArrowheads="1"/>
-          </p:cNvPicPr>
-          <p:nvPr/>
-        </p:nvPicPr>
-        <p:blipFill>
-          <a:blip r:embed="rId2">
-            <a:extLst>
-              <a:ext uri="{28A0092B-C50C-407E-A947-70E740481C1C}">
-                <a14:useLocalDpi xmlns:a14="http://schemas.microsoft.com/office/drawing/2010/main" val="0"/>
-              </a:ext>
-            </a:extLst>
-          </a:blip>
-          <a:srcRect/>
-          <a:stretch>
-            <a:fillRect/>
-          </a:stretch>
-        </p:blipFill>
-        <p:spPr bwMode="auto">
-          <a:xfrm>
-            <a:off x="2145747" y="900621"/>
-            <a:ext cx="4852506" cy="4738179"/>
-          </a:xfrm>
-          <a:prstGeom prst="rect">
-            <a:avLst/>
-          </a:prstGeom>
-          <a:noFill/>
-          <a:extLst>
-            <a:ext uri="{909E8E84-426E-40DD-AFC4-6F175D3DCCD1}">
-              <a14:hiddenFill xmlns:a14="http://schemas.microsoft.com/office/drawing/2010/main">
-                <a:solidFill>
-                  <a:srgbClr val="FFFFFF"/>
-                </a:solidFill>
-              </a14:hiddenFill>
-            </a:ext>
-          </a:extLst>
-        </p:spPr>
-      </p:pic>
-      <p:sp>
-        <p:nvSpPr>
-          <p:cNvPr id="4" name="TextBox 3"/>
-          <p:cNvSpPr txBox="1"/>
-          <p:nvPr/>
-        </p:nvSpPr>
-        <p:spPr>
-          <a:xfrm>
-            <a:off x="482579" y="5943600"/>
-            <a:ext cx="8178841" cy="307777"/>
-          </a:xfrm>
-          <a:prstGeom prst="rect">
-            <a:avLst/>
-          </a:prstGeom>
-          <a:noFill/>
-        </p:spPr>
-        <p:txBody>
-          <a:bodyPr wrap="none" rtlCol="0">
-            <a:spAutoFit/>
-          </a:bodyPr>
-          <a:lstStyle/>
-          <a:p>
-            <a:pPr algn="ctr"/>
-            <a:r>
-              <a:rPr lang="en-US" sz="1400" b="0" dirty="0" smtClean="0"/>
-              <a:t>Low SVM performance may be due to not having enough time to properly tune the model parameters</a:t>
-            </a:r>
-            <a:endParaRPr lang="en-US" sz="1400" b="0" dirty="0"/>
-          </a:p>
-        </p:txBody>
-      </p:sp>
-    </p:spTree>
-    <p:extLst>
-      <p:ext uri="{BB962C8B-B14F-4D97-AF65-F5344CB8AC3E}">
-        <p14:creationId xmlns:p14="http://schemas.microsoft.com/office/powerpoint/2010/main" val="3331363611"/>
-      </p:ext>
-    </p:extLst>
-  </p:cSld>
-  <p:clrMapOvr>
-    <a:masterClrMapping/>
-  </p:clrMapOvr>
-  <p:timing>
-    <p:tnLst>
-      <p:par>
-        <p:cTn id="1" dur="indefinite" restart="never" nodeType="tmRoot"/>
-      </p:par>
-    </p:tnLst>
-  </p:timing>
-</p:sld>
-</file>
-
-<file path=ppt/slides/slide11.xml><?xml version="1.0" encoding="utf-8"?>
-<p:sld xmlns:a="http://schemas.openxmlformats.org/drawingml/2006/main" xmlns:r="http://schemas.openxmlformats.org/officeDocument/2006/relationships" xmlns:p="http://schemas.openxmlformats.org/presentationml/2006/main">
-  <p:cSld>
-    <p:spTree>
-      <p:nvGrpSpPr>
-        <p:cNvPr id="1" name=""/>
-        <p:cNvGrpSpPr/>
-        <p:nvPr/>
-      </p:nvGrpSpPr>
-      <p:grpSpPr>
-        <a:xfrm>
-          <a:off x="0" y="0"/>
-          <a:ext cx="0" cy="0"/>
-          <a:chOff x="0" y="0"/>
-          <a:chExt cx="0" cy="0"/>
-        </a:xfrm>
-      </p:grpSpPr>
-      <p:sp>
-        <p:nvSpPr>
-          <p:cNvPr id="2" name="Title 1"/>
-          <p:cNvSpPr>
-            <a:spLocks noGrp="1"/>
-          </p:cNvSpPr>
-          <p:nvPr>
-            <p:ph type="title"/>
-          </p:nvPr>
-        </p:nvSpPr>
-        <p:spPr/>
-        <p:txBody>
-          <a:bodyPr/>
-          <a:lstStyle/>
-          <a:p>
-            <a:r>
-              <a:rPr lang="en-US" dirty="0" smtClean="0"/>
               <a:t>K nearest neighbors performance by parameter k</a:t>
             </a:r>
             <a:endParaRPr lang="en-US" dirty="0"/>
@@ -3064,6 +2932,245 @@
 </p:sld>
 </file>
 
+<file path=ppt/slides/slide11.xml><?xml version="1.0" encoding="utf-8"?>
+<p:sld xmlns:a="http://schemas.openxmlformats.org/drawingml/2006/main" xmlns:r="http://schemas.openxmlformats.org/officeDocument/2006/relationships" xmlns:p="http://schemas.openxmlformats.org/presentationml/2006/main">
+  <p:cSld>
+    <p:spTree>
+      <p:nvGrpSpPr>
+        <p:cNvPr id="1" name=""/>
+        <p:cNvGrpSpPr/>
+        <p:nvPr/>
+      </p:nvGrpSpPr>
+      <p:grpSpPr>
+        <a:xfrm>
+          <a:off x="0" y="0"/>
+          <a:ext cx="0" cy="0"/>
+          <a:chOff x="0" y="0"/>
+          <a:chExt cx="0" cy="0"/>
+        </a:xfrm>
+      </p:grpSpPr>
+      <p:sp>
+        <p:nvSpPr>
+          <p:cNvPr id="2" name="Title 1"/>
+          <p:cNvSpPr>
+            <a:spLocks noGrp="1"/>
+          </p:cNvSpPr>
+          <p:nvPr>
+            <p:ph type="title"/>
+          </p:nvPr>
+        </p:nvSpPr>
+        <p:spPr/>
+        <p:txBody>
+          <a:bodyPr/>
+          <a:lstStyle/>
+          <a:p>
+            <a:r>
+              <a:rPr lang="en-US" dirty="0" smtClean="0"/>
+              <a:t>Feature scaling has a large impact on model performance</a:t>
+            </a:r>
+            <a:endParaRPr lang="en-US" dirty="0"/>
+          </a:p>
+        </p:txBody>
+      </p:sp>
+      <p:pic>
+        <p:nvPicPr>
+          <p:cNvPr id="7170" name="Picture 2" descr="C:\Users\SKH469\capitalone-pilottwo\project_2\Model_Compare.png"/>
+          <p:cNvPicPr>
+            <a:picLocks noChangeAspect="1" noChangeArrowheads="1"/>
+          </p:cNvPicPr>
+          <p:nvPr/>
+        </p:nvPicPr>
+        <p:blipFill>
+          <a:blip r:embed="rId2">
+            <a:extLst>
+              <a:ext uri="{28A0092B-C50C-407E-A947-70E740481C1C}">
+                <a14:useLocalDpi xmlns:a14="http://schemas.microsoft.com/office/drawing/2010/main" val="0"/>
+              </a:ext>
+            </a:extLst>
+          </a:blip>
+          <a:srcRect/>
+          <a:stretch>
+            <a:fillRect/>
+          </a:stretch>
+        </p:blipFill>
+        <p:spPr bwMode="auto">
+          <a:xfrm>
+            <a:off x="381000" y="1524000"/>
+            <a:ext cx="3979970" cy="3886200"/>
+          </a:xfrm>
+          <a:prstGeom prst="rect">
+            <a:avLst/>
+          </a:prstGeom>
+          <a:noFill/>
+          <a:extLst>
+            <a:ext uri="{909E8E84-426E-40DD-AFC4-6F175D3DCCD1}">
+              <a14:hiddenFill xmlns:a14="http://schemas.microsoft.com/office/drawing/2010/main">
+                <a:solidFill>
+                  <a:srgbClr val="FFFFFF"/>
+                </a:solidFill>
+              </a14:hiddenFill>
+            </a:ext>
+          </a:extLst>
+        </p:spPr>
+      </p:pic>
+      <p:sp>
+        <p:nvSpPr>
+          <p:cNvPr id="4" name="TextBox 3"/>
+          <p:cNvSpPr txBox="1"/>
+          <p:nvPr/>
+        </p:nvSpPr>
+        <p:spPr>
+          <a:xfrm>
+            <a:off x="482579" y="5943600"/>
+            <a:ext cx="8178841" cy="307777"/>
+          </a:xfrm>
+          <a:prstGeom prst="rect">
+            <a:avLst/>
+          </a:prstGeom>
+          <a:noFill/>
+        </p:spPr>
+        <p:txBody>
+          <a:bodyPr wrap="none" rtlCol="0">
+            <a:spAutoFit/>
+          </a:bodyPr>
+          <a:lstStyle/>
+          <a:p>
+            <a:pPr algn="ctr"/>
+            <a:r>
+              <a:rPr lang="en-US" sz="1400" b="0" dirty="0" smtClean="0"/>
+              <a:t>Low SVM performance may be due to not having enough time to properly tune the model parameters</a:t>
+            </a:r>
+            <a:endParaRPr lang="en-US" sz="1400" b="0" dirty="0"/>
+          </a:p>
+        </p:txBody>
+      </p:sp>
+      <p:pic>
+        <p:nvPicPr>
+          <p:cNvPr id="1026" name="Picture 2" descr="C:\Users\SKH469\AppData\Local\Microsoft\Windows\Temporary Internet Files\Content.Outlook\K2PPQO5A\Model_Compare_rescale.png"/>
+          <p:cNvPicPr>
+            <a:picLocks noChangeAspect="1" noChangeArrowheads="1"/>
+          </p:cNvPicPr>
+          <p:nvPr/>
+        </p:nvPicPr>
+        <p:blipFill>
+          <a:blip r:embed="rId3">
+            <a:extLst>
+              <a:ext uri="{28A0092B-C50C-407E-A947-70E740481C1C}">
+                <a14:useLocalDpi xmlns:a14="http://schemas.microsoft.com/office/drawing/2010/main" val="0"/>
+              </a:ext>
+            </a:extLst>
+          </a:blip>
+          <a:srcRect/>
+          <a:stretch>
+            <a:fillRect/>
+          </a:stretch>
+        </p:blipFill>
+        <p:spPr bwMode="auto">
+          <a:xfrm>
+            <a:off x="4800600" y="1524000"/>
+            <a:ext cx="3990388" cy="3886200"/>
+          </a:xfrm>
+          <a:prstGeom prst="rect">
+            <a:avLst/>
+          </a:prstGeom>
+          <a:noFill/>
+          <a:extLst>
+            <a:ext uri="{909E8E84-426E-40DD-AFC4-6F175D3DCCD1}">
+              <a14:hiddenFill xmlns:a14="http://schemas.microsoft.com/office/drawing/2010/main">
+                <a:solidFill>
+                  <a:srgbClr val="FFFFFF"/>
+                </a:solidFill>
+              </a14:hiddenFill>
+            </a:ext>
+          </a:extLst>
+        </p:spPr>
+      </p:pic>
+      <p:sp>
+        <p:nvSpPr>
+          <p:cNvPr id="3" name="TextBox 2"/>
+          <p:cNvSpPr txBox="1"/>
+          <p:nvPr/>
+        </p:nvSpPr>
+        <p:spPr>
+          <a:xfrm>
+            <a:off x="1446104" y="1066800"/>
+            <a:ext cx="1712136" cy="338554"/>
+          </a:xfrm>
+          <a:prstGeom prst="rect">
+            <a:avLst/>
+          </a:prstGeom>
+          <a:noFill/>
+        </p:spPr>
+        <p:txBody>
+          <a:bodyPr wrap="none" rtlCol="0">
+            <a:spAutoFit/>
+          </a:bodyPr>
+          <a:lstStyle/>
+          <a:p>
+            <a:pPr algn="ctr"/>
+            <a:r>
+              <a:rPr lang="en-US" dirty="0" smtClean="0"/>
+              <a:t>Withou</a:t>
+            </a:r>
+            <a:r>
+              <a:rPr lang="en-US" dirty="0" smtClean="0"/>
+              <a:t>t scaling</a:t>
+            </a:r>
+            <a:endParaRPr lang="en-US" dirty="0"/>
+          </a:p>
+        </p:txBody>
+      </p:sp>
+      <p:sp>
+        <p:nvSpPr>
+          <p:cNvPr id="7" name="TextBox 6"/>
+          <p:cNvSpPr txBox="1"/>
+          <p:nvPr/>
+        </p:nvSpPr>
+        <p:spPr>
+          <a:xfrm>
+            <a:off x="6255500" y="1065702"/>
+            <a:ext cx="1393138" cy="338554"/>
+          </a:xfrm>
+          <a:prstGeom prst="rect">
+            <a:avLst/>
+          </a:prstGeom>
+          <a:noFill/>
+        </p:spPr>
+        <p:txBody>
+          <a:bodyPr wrap="none" rtlCol="0">
+            <a:spAutoFit/>
+          </a:bodyPr>
+          <a:lstStyle/>
+          <a:p>
+            <a:pPr algn="ctr"/>
+            <a:r>
+              <a:rPr lang="en-US" dirty="0" smtClean="0"/>
+              <a:t>With scaling</a:t>
+            </a:r>
+            <a:endParaRPr lang="en-US" dirty="0"/>
+          </a:p>
+        </p:txBody>
+      </p:sp>
+    </p:spTree>
+    <p:extLst>
+      <p:ext uri="{BB962C8B-B14F-4D97-AF65-F5344CB8AC3E}">
+        <p14:creationId xmlns:p14="http://schemas.microsoft.com/office/powerpoint/2010/main" val="3331363611"/>
+      </p:ext>
+    </p:extLst>
+  </p:cSld>
+  <p:clrMapOvr>
+    <a:masterClrMapping/>
+  </p:clrMapOvr>
+  <p:timing>
+    <p:tnLst>
+      <p:par>
+        <p:cTn id="1" dur="indefinite" restart="never" nodeType="tmRoot"/>
+      </p:par>
+    </p:tnLst>
+  </p:timing>
+</p:sld>
+</file>
+
 <file path=ppt/slides/slide2.xml><?xml version="1.0" encoding="utf-8"?>
 <p:sld xmlns:a="http://schemas.openxmlformats.org/drawingml/2006/main" xmlns:r="http://schemas.openxmlformats.org/officeDocument/2006/relationships" xmlns:p="http://schemas.openxmlformats.org/presentationml/2006/main">
   <p:cSld>
@@ -4436,12 +4543,12 @@
               <a:t>Option 1: Impute </a:t>
             </a:r>
             <a:r>
-              <a:rPr lang="en-US" dirty="0" err="1" smtClean="0"/>
-              <a:t>missings</a:t>
-            </a:r>
-            <a:r>
               <a:rPr lang="en-US" dirty="0" smtClean="0"/>
-              <a:t> to mean or zero</a:t>
+              <a:t>missing data points </a:t>
+            </a:r>
+            <a:r>
+              <a:rPr lang="en-US" dirty="0" smtClean="0"/>
+              <a:t>to mean or zero</a:t>
             </a:r>
           </a:p>
           <a:p>
@@ -4483,12 +4590,12 @@
               <a:t>and use all observations that are </a:t>
             </a:r>
             <a:r>
-              <a:rPr lang="en-US" dirty="0" err="1"/>
-              <a:t>nonmissing</a:t>
+              <a:rPr lang="en-US" dirty="0" smtClean="0"/>
+              <a:t>non-missing </a:t>
             </a:r>
             <a:r>
               <a:rPr lang="en-US" dirty="0"/>
-              <a:t> on the remaining </a:t>
+              <a:t>on the remaining </a:t>
             </a:r>
             <a:r>
               <a:rPr lang="en-US" dirty="0" smtClean="0"/>
@@ -6790,8 +6897,8 @@
         </p:nvSpPr>
         <p:spPr>
           <a:xfrm>
-            <a:off x="1371600" y="5794177"/>
-            <a:ext cx="6396302" cy="307777"/>
+            <a:off x="1128745" y="5794177"/>
+            <a:ext cx="6882013" cy="307777"/>
           </a:xfrm>
           <a:prstGeom prst="rect">
             <a:avLst/>
@@ -6807,7 +6914,11 @@
             <a:pPr algn="ctr"/>
             <a:r>
               <a:rPr lang="en-US" sz="1400" dirty="0"/>
-              <a:t>Lasso regularization (optimal parameter 0.19 chosen by cross-validation</a:t>
+              <a:t>Lasso regularization (optimal parameter 0.19 chosen by </a:t>
+            </a:r>
+            <a:r>
+              <a:rPr lang="en-US" sz="1400" dirty="0" smtClean="0"/>
+              <a:t>4-fold cross-validation</a:t>
             </a:r>
             <a:r>
               <a:rPr lang="en-US" sz="1400" dirty="0" smtClean="0"/>

</xml_diff>